<commit_message>
feat: added quick-reference page
</commit_message>
<xml_diff>
--- a/other/sigscript.pptx
+++ b/other/sigscript.pptx
@@ -3335,7 +3335,7 @@
         </p:nvSpPr>
         <p:spPr>
           <a:xfrm rot="5400000">
-            <a:off x="2785241" y="987972"/>
+            <a:off x="738727" y="935721"/>
             <a:ext cx="3145536" cy="2711669"/>
           </a:xfrm>
           <a:prstGeom prst="hexagon">
@@ -3344,15 +3344,15 @@
         </p:spPr>
         <p:style>
           <a:lnRef idx="2">
-            <a:schemeClr val="accent1">
+            <a:schemeClr val="dk1">
               <a:shade val="15000"/>
             </a:schemeClr>
           </a:lnRef>
           <a:fillRef idx="1">
-            <a:schemeClr val="accent1"/>
+            <a:schemeClr val="dk1"/>
           </a:fillRef>
           <a:effectRef idx="0">
-            <a:schemeClr val="accent1"/>
+            <a:schemeClr val="dk1"/>
           </a:effectRef>
           <a:fontRef idx="minor">
             <a:schemeClr val="lt1"/>
@@ -3381,7 +3381,7 @@
         </p:nvSpPr>
         <p:spPr>
           <a:xfrm rot="5400000">
-            <a:off x="3095764" y="1255664"/>
+            <a:off x="1049250" y="1203413"/>
             <a:ext cx="2524489" cy="2176284"/>
           </a:xfrm>
           <a:prstGeom prst="hexagon">
@@ -3416,6 +3416,72 @@
           </a:p>
         </p:txBody>
       </p:sp>
+      <p:pic>
+        <p:nvPicPr>
+          <p:cNvPr id="8" name="Graphic 7" descr="Scroll with solid fill">
+            <a:extLst>
+              <a:ext uri="{FF2B5EF4-FFF2-40B4-BE49-F238E27FC236}">
+                <a16:creationId xmlns:a16="http://schemas.microsoft.com/office/drawing/2014/main" id="{2B702B5B-3939-C615-AA64-D003078CB13C}"/>
+              </a:ext>
+            </a:extLst>
+          </p:cNvPr>
+          <p:cNvPicPr>
+            <a:picLocks noChangeAspect="1"/>
+          </p:cNvPicPr>
+          <p:nvPr/>
+        </p:nvPicPr>
+        <p:blipFill>
+          <a:blip r:embed="rId2">
+            <a:extLst>
+              <a:ext uri="{96DAC541-7B7A-43D3-8B79-37D633B846F1}">
+                <asvg:svgBlip xmlns:asvg="http://schemas.microsoft.com/office/drawing/2016/SVG/main" r:embed="rId3"/>
+              </a:ext>
+            </a:extLst>
+          </a:blip>
+          <a:stretch>
+            <a:fillRect/>
+          </a:stretch>
+        </p:blipFill>
+        <p:spPr>
+          <a:xfrm>
+            <a:off x="1403849" y="1461540"/>
+            <a:ext cx="1660029" cy="1660029"/>
+          </a:xfrm>
+          <a:prstGeom prst="rect">
+            <a:avLst/>
+          </a:prstGeom>
+        </p:spPr>
+      </p:pic>
+      <p:pic>
+        <p:nvPicPr>
+          <p:cNvPr id="9" name="Picture 8">
+            <a:extLst>
+              <a:ext uri="{FF2B5EF4-FFF2-40B4-BE49-F238E27FC236}">
+                <a16:creationId xmlns:a16="http://schemas.microsoft.com/office/drawing/2014/main" id="{85177C9E-4F87-46E2-1592-DECCF36E6E5A}"/>
+              </a:ext>
+            </a:extLst>
+          </p:cNvPr>
+          <p:cNvPicPr>
+            <a:picLocks noChangeAspect="1"/>
+          </p:cNvPicPr>
+          <p:nvPr/>
+        </p:nvPicPr>
+        <p:blipFill>
+          <a:blip r:embed="rId4"/>
+          <a:stretch>
+            <a:fillRect/>
+          </a:stretch>
+        </p:blipFill>
+        <p:spPr>
+          <a:xfrm>
+            <a:off x="5132136" y="612321"/>
+            <a:ext cx="4826000" cy="4762500"/>
+          </a:xfrm>
+          <a:prstGeom prst="rect">
+            <a:avLst/>
+          </a:prstGeom>
+        </p:spPr>
+      </p:pic>
     </p:spTree>
     <p:extLst>
       <p:ext uri="{BB962C8B-B14F-4D97-AF65-F5344CB8AC3E}">

</xml_diff>